<commit_message>
Rapport Optimisation Fini / Manque que le git merge
</commit_message>
<xml_diff>
--- a/Rapport Optimisation.pptx
+++ b/Rapport Optimisation.pptx
@@ -109,6 +109,11 @@
       </a:defRPr>
     </a:lvl9pPr>
   </p:defaultTextStyle>
+  <p:extLst>
+    <p:ext uri="{EFAFB233-063F-42B5-8137-9DF3F51BA10A}">
+      <p15:sldGuideLst xmlns:p15="http://schemas.microsoft.com/office/powerpoint/2012/main"/>
+    </p:ext>
+  </p:extLst>
 </p:presentation>
 </file>
 
@@ -301,7 +306,7 @@
             <a:fld id="{B61BEF0D-F0BB-DE4B-95CE-6DB70DBA9567}" type="datetimeFigureOut">
               <a:rPr lang="en-US" dirty="0"/>
               <a:pPr/>
-              <a:t>2/24/2021</a:t>
+              <a:t>3/3/2021</a:t>
             </a:fld>
             <a:endParaRPr lang="en-US" dirty="0"/>
           </a:p>
@@ -636,7 +641,7 @@
             <a:fld id="{B61BEF0D-F0BB-DE4B-95CE-6DB70DBA9567}" type="datetimeFigureOut">
               <a:rPr lang="en-US" dirty="0"/>
               <a:pPr/>
-              <a:t>2/24/2021</a:t>
+              <a:t>3/3/2021</a:t>
             </a:fld>
             <a:endParaRPr lang="en-US" dirty="0"/>
           </a:p>
@@ -1034,7 +1039,7 @@
             <a:fld id="{B61BEF0D-F0BB-DE4B-95CE-6DB70DBA9567}" type="datetimeFigureOut">
               <a:rPr lang="en-US" dirty="0"/>
               <a:pPr/>
-              <a:t>2/24/2021</a:t>
+              <a:t>3/3/2021</a:t>
             </a:fld>
             <a:endParaRPr lang="en-US" dirty="0"/>
           </a:p>
@@ -1367,7 +1372,7 @@
             <a:fld id="{B61BEF0D-F0BB-DE4B-95CE-6DB70DBA9567}" type="datetimeFigureOut">
               <a:rPr lang="en-US" dirty="0"/>
               <a:pPr/>
-              <a:t>2/24/2021</a:t>
+              <a:t>3/3/2021</a:t>
             </a:fld>
             <a:endParaRPr lang="en-US" dirty="0"/>
           </a:p>
@@ -1684,7 +1689,7 @@
             <a:fld id="{B61BEF0D-F0BB-DE4B-95CE-6DB70DBA9567}" type="datetimeFigureOut">
               <a:rPr lang="en-US" dirty="0"/>
               <a:pPr/>
-              <a:t>2/24/2021</a:t>
+              <a:t>3/3/2021</a:t>
             </a:fld>
             <a:endParaRPr lang="en-US" dirty="0"/>
           </a:p>
@@ -2077,7 +2082,7 @@
             <a:fld id="{B61BEF0D-F0BB-DE4B-95CE-6DB70DBA9567}" type="datetimeFigureOut">
               <a:rPr lang="en-US" dirty="0"/>
               <a:pPr/>
-              <a:t>2/24/2021</a:t>
+              <a:t>3/3/2021</a:t>
             </a:fld>
             <a:endParaRPr lang="en-US" dirty="0"/>
           </a:p>
@@ -2331,7 +2336,7 @@
             <a:fld id="{B61BEF0D-F0BB-DE4B-95CE-6DB70DBA9567}" type="datetimeFigureOut">
               <a:rPr lang="en-US" dirty="0"/>
               <a:pPr/>
-              <a:t>2/24/2021</a:t>
+              <a:t>3/3/2021</a:t>
             </a:fld>
             <a:endParaRPr lang="en-US" dirty="0"/>
           </a:p>
@@ -2590,7 +2595,7 @@
             <a:fld id="{B61BEF0D-F0BB-DE4B-95CE-6DB70DBA9567}" type="datetimeFigureOut">
               <a:rPr lang="en-US" dirty="0"/>
               <a:pPr/>
-              <a:t>2/24/2021</a:t>
+              <a:t>3/3/2021</a:t>
             </a:fld>
             <a:endParaRPr lang="en-US" dirty="0"/>
           </a:p>
@@ -2849,7 +2854,7 @@
             <a:fld id="{B61BEF0D-F0BB-DE4B-95CE-6DB70DBA9567}" type="datetimeFigureOut">
               <a:rPr lang="en-US" dirty="0"/>
               <a:pPr/>
-              <a:t>2/24/2021</a:t>
+              <a:t>3/3/2021</a:t>
             </a:fld>
             <a:endParaRPr lang="en-US" dirty="0"/>
           </a:p>
@@ -3175,7 +3180,7 @@
             <a:fld id="{B61BEF0D-F0BB-DE4B-95CE-6DB70DBA9567}" type="datetimeFigureOut">
               <a:rPr lang="en-US" dirty="0"/>
               <a:pPr/>
-              <a:t>2/24/2021</a:t>
+              <a:t>3/3/2021</a:t>
             </a:fld>
             <a:endParaRPr lang="en-US" dirty="0"/>
           </a:p>
@@ -3495,7 +3500,7 @@
             <a:fld id="{B61BEF0D-F0BB-DE4B-95CE-6DB70DBA9567}" type="datetimeFigureOut">
               <a:rPr lang="en-US" dirty="0"/>
               <a:pPr/>
-              <a:t>2/24/2021</a:t>
+              <a:t>3/3/2021</a:t>
             </a:fld>
             <a:endParaRPr lang="en-US" dirty="0"/>
           </a:p>
@@ -3949,7 +3954,7 @@
             <a:fld id="{B61BEF0D-F0BB-DE4B-95CE-6DB70DBA9567}" type="datetimeFigureOut">
               <a:rPr lang="en-US" dirty="0"/>
               <a:pPr/>
-              <a:t>2/24/2021</a:t>
+              <a:t>3/3/2021</a:t>
             </a:fld>
             <a:endParaRPr lang="en-US" dirty="0"/>
           </a:p>
@@ -4151,7 +4156,7 @@
             <a:fld id="{B61BEF0D-F0BB-DE4B-95CE-6DB70DBA9567}" type="datetimeFigureOut">
               <a:rPr lang="en-US" dirty="0"/>
               <a:pPr/>
-              <a:t>2/24/2021</a:t>
+              <a:t>3/3/2021</a:t>
             </a:fld>
             <a:endParaRPr lang="en-US" dirty="0"/>
           </a:p>
@@ -4325,7 +4330,7 @@
             <a:fld id="{B61BEF0D-F0BB-DE4B-95CE-6DB70DBA9567}" type="datetimeFigureOut">
               <a:rPr lang="en-US" dirty="0"/>
               <a:pPr/>
-              <a:t>2/24/2021</a:t>
+              <a:t>3/3/2021</a:t>
             </a:fld>
             <a:endParaRPr lang="en-US" dirty="0"/>
           </a:p>
@@ -4655,7 +4660,7 @@
             <a:fld id="{B61BEF0D-F0BB-DE4B-95CE-6DB70DBA9567}" type="datetimeFigureOut">
               <a:rPr lang="en-US" dirty="0"/>
               <a:pPr/>
-              <a:t>2/24/2021</a:t>
+              <a:t>3/3/2021</a:t>
             </a:fld>
             <a:endParaRPr lang="en-US" dirty="0"/>
           </a:p>
@@ -4997,7 +5002,7 @@
             <a:fld id="{B61BEF0D-F0BB-DE4B-95CE-6DB70DBA9567}" type="datetimeFigureOut">
               <a:rPr lang="en-US" dirty="0"/>
               <a:pPr/>
-              <a:t>2/24/2021</a:t>
+              <a:t>3/3/2021</a:t>
             </a:fld>
             <a:endParaRPr lang="en-US" dirty="0"/>
           </a:p>
@@ -7111,7 +7116,7 @@
             <a:fld id="{B61BEF0D-F0BB-DE4B-95CE-6DB70DBA9567}" type="datetimeFigureOut">
               <a:rPr lang="en-US" dirty="0"/>
               <a:pPr/>
-              <a:t>2/24/2021</a:t>
+              <a:t>3/3/2021</a:t>
             </a:fld>
             <a:endParaRPr lang="en-US" dirty="0"/>
           </a:p>
@@ -8223,12 +8228,84 @@
           </a:prstGeom>
         </p:spPr>
       </p:pic>
+      <p:sp>
+        <p:nvSpPr>
+          <p:cNvPr id="9" name="ZoneTexte 8">
+            <a:extLst>
+              <a:ext uri="{FF2B5EF4-FFF2-40B4-BE49-F238E27FC236}">
+                <a16:creationId xmlns:a16="http://schemas.microsoft.com/office/drawing/2014/main" id="{F55D50DE-7BC4-4B72-997D-63778F32191F}"/>
+              </a:ext>
+            </a:extLst>
+          </p:cNvPr>
+          <p:cNvSpPr txBox="1"/>
+          <p:nvPr/>
+        </p:nvSpPr>
+        <p:spPr>
+          <a:xfrm>
+            <a:off x="1588176" y="1064812"/>
+            <a:ext cx="3456264" cy="369332"/>
+          </a:xfrm>
+          <a:prstGeom prst="rect">
+            <a:avLst/>
+          </a:prstGeom>
+          <a:noFill/>
+        </p:spPr>
+        <p:txBody>
+          <a:bodyPr wrap="square" rtlCol="0">
+            <a:spAutoFit/>
+          </a:bodyPr>
+          <a:lstStyle/>
+          <a:p>
+            <a:pPr algn="ctr"/>
+            <a:r>
+              <a:rPr lang="fr-FR" b="1" u="sng" dirty="0"/>
+              <a:t>Avant:</a:t>
+            </a:r>
+          </a:p>
+        </p:txBody>
+      </p:sp>
+      <p:sp>
+        <p:nvSpPr>
+          <p:cNvPr id="10" name="ZoneTexte 9">
+            <a:extLst>
+              <a:ext uri="{FF2B5EF4-FFF2-40B4-BE49-F238E27FC236}">
+                <a16:creationId xmlns:a16="http://schemas.microsoft.com/office/drawing/2014/main" id="{6C768659-1767-43E4-8152-D098BBC11CC2}"/>
+              </a:ext>
+            </a:extLst>
+          </p:cNvPr>
+          <p:cNvSpPr txBox="1"/>
+          <p:nvPr/>
+        </p:nvSpPr>
+        <p:spPr>
+          <a:xfrm>
+            <a:off x="7721927" y="1064812"/>
+            <a:ext cx="3456264" cy="369332"/>
+          </a:xfrm>
+          <a:prstGeom prst="rect">
+            <a:avLst/>
+          </a:prstGeom>
+          <a:noFill/>
+        </p:spPr>
+        <p:txBody>
+          <a:bodyPr wrap="square" rtlCol="0">
+            <a:spAutoFit/>
+          </a:bodyPr>
+          <a:lstStyle/>
+          <a:p>
+            <a:pPr algn="ctr"/>
+            <a:r>
+              <a:rPr lang="fr-FR" b="1" u="sng" dirty="0"/>
+              <a:t>Après:</a:t>
+            </a:r>
+          </a:p>
+        </p:txBody>
+      </p:sp>
       <p:pic>
         <p:nvPicPr>
-          <p:cNvPr id="8" name="Image 7">
+          <p:cNvPr id="3" name="Image 2">
             <a:extLst>
               <a:ext uri="{FF2B5EF4-FFF2-40B4-BE49-F238E27FC236}">
-                <a16:creationId xmlns:a16="http://schemas.microsoft.com/office/drawing/2014/main" id="{F755C737-7687-472E-A15E-F2BFC34D0F54}"/>
+                <a16:creationId xmlns:a16="http://schemas.microsoft.com/office/drawing/2014/main" id="{3FB5238A-DCB1-4D43-9649-B7DCEBFFAE73}"/>
               </a:ext>
             </a:extLst>
           </p:cNvPr>
@@ -8245,86 +8322,14 @@
         </p:blipFill>
         <p:spPr>
           <a:xfrm>
-            <a:off x="5924649" y="1875764"/>
-            <a:ext cx="6267351" cy="4465487"/>
+            <a:off x="6037134" y="1973637"/>
+            <a:ext cx="6150532" cy="4391636"/>
           </a:xfrm>
           <a:prstGeom prst="rect">
             <a:avLst/>
           </a:prstGeom>
         </p:spPr>
       </p:pic>
-      <p:sp>
-        <p:nvSpPr>
-          <p:cNvPr id="9" name="ZoneTexte 8">
-            <a:extLst>
-              <a:ext uri="{FF2B5EF4-FFF2-40B4-BE49-F238E27FC236}">
-                <a16:creationId xmlns:a16="http://schemas.microsoft.com/office/drawing/2014/main" id="{F55D50DE-7BC4-4B72-997D-63778F32191F}"/>
-              </a:ext>
-            </a:extLst>
-          </p:cNvPr>
-          <p:cNvSpPr txBox="1"/>
-          <p:nvPr/>
-        </p:nvSpPr>
-        <p:spPr>
-          <a:xfrm>
-            <a:off x="1588176" y="1064812"/>
-            <a:ext cx="3456264" cy="369332"/>
-          </a:xfrm>
-          <a:prstGeom prst="rect">
-            <a:avLst/>
-          </a:prstGeom>
-          <a:noFill/>
-        </p:spPr>
-        <p:txBody>
-          <a:bodyPr wrap="square" rtlCol="0">
-            <a:spAutoFit/>
-          </a:bodyPr>
-          <a:lstStyle/>
-          <a:p>
-            <a:pPr algn="ctr"/>
-            <a:r>
-              <a:rPr lang="fr-FR" b="1" u="sng" dirty="0"/>
-              <a:t>Avant:</a:t>
-            </a:r>
-          </a:p>
-        </p:txBody>
-      </p:sp>
-      <p:sp>
-        <p:nvSpPr>
-          <p:cNvPr id="10" name="ZoneTexte 9">
-            <a:extLst>
-              <a:ext uri="{FF2B5EF4-FFF2-40B4-BE49-F238E27FC236}">
-                <a16:creationId xmlns:a16="http://schemas.microsoft.com/office/drawing/2014/main" id="{6C768659-1767-43E4-8152-D098BBC11CC2}"/>
-              </a:ext>
-            </a:extLst>
-          </p:cNvPr>
-          <p:cNvSpPr txBox="1"/>
-          <p:nvPr/>
-        </p:nvSpPr>
-        <p:spPr>
-          <a:xfrm>
-            <a:off x="7721927" y="1064812"/>
-            <a:ext cx="3456264" cy="369332"/>
-          </a:xfrm>
-          <a:prstGeom prst="rect">
-            <a:avLst/>
-          </a:prstGeom>
-          <a:noFill/>
-        </p:spPr>
-        <p:txBody>
-          <a:bodyPr wrap="square" rtlCol="0">
-            <a:spAutoFit/>
-          </a:bodyPr>
-          <a:lstStyle/>
-          <a:p>
-            <a:pPr algn="ctr"/>
-            <a:r>
-              <a:rPr lang="fr-FR" b="1" u="sng" dirty="0"/>
-              <a:t>Après:</a:t>
-            </a:r>
-          </a:p>
-        </p:txBody>
-      </p:sp>
     </p:spTree>
     <p:extLst>
       <p:ext uri="{BB962C8B-B14F-4D97-AF65-F5344CB8AC3E}">

</xml_diff>